<commit_message>
Made edits to the poster
</commit_message>
<xml_diff>
--- a/Documentation/metromojo_poster.pptx
+++ b/Documentation/metromojo_poster.pptx
@@ -243,7 +243,7 @@
           <a:p>
             <a:fld id="{0BE11D4F-DB33-4DA7-996A-B7BA98720CF3}" type="datetimeFigureOut">
               <a:rPr lang="en-US" smtClean="0"/>
-              <a:t>6/7/2019</a:t>
+              <a:t>6/10/2019</a:t>
             </a:fld>
             <a:endParaRPr lang="en-US"/>
           </a:p>
@@ -413,7 +413,7 @@
           <a:p>
             <a:fld id="{0BE11D4F-DB33-4DA7-996A-B7BA98720CF3}" type="datetimeFigureOut">
               <a:rPr lang="en-US" smtClean="0"/>
-              <a:t>6/7/2019</a:t>
+              <a:t>6/10/2019</a:t>
             </a:fld>
             <a:endParaRPr lang="en-US"/>
           </a:p>
@@ -593,7 +593,7 @@
           <a:p>
             <a:fld id="{0BE11D4F-DB33-4DA7-996A-B7BA98720CF3}" type="datetimeFigureOut">
               <a:rPr lang="en-US" smtClean="0"/>
-              <a:t>6/7/2019</a:t>
+              <a:t>6/10/2019</a:t>
             </a:fld>
             <a:endParaRPr lang="en-US"/>
           </a:p>
@@ -763,7 +763,7 @@
           <a:p>
             <a:fld id="{0BE11D4F-DB33-4DA7-996A-B7BA98720CF3}" type="datetimeFigureOut">
               <a:rPr lang="en-US" smtClean="0"/>
-              <a:t>6/7/2019</a:t>
+              <a:t>6/10/2019</a:t>
             </a:fld>
             <a:endParaRPr lang="en-US"/>
           </a:p>
@@ -1007,7 +1007,7 @@
           <a:p>
             <a:fld id="{0BE11D4F-DB33-4DA7-996A-B7BA98720CF3}" type="datetimeFigureOut">
               <a:rPr lang="en-US" smtClean="0"/>
-              <a:t>6/7/2019</a:t>
+              <a:t>6/10/2019</a:t>
             </a:fld>
             <a:endParaRPr lang="en-US"/>
           </a:p>
@@ -1239,7 +1239,7 @@
           <a:p>
             <a:fld id="{0BE11D4F-DB33-4DA7-996A-B7BA98720CF3}" type="datetimeFigureOut">
               <a:rPr lang="en-US" smtClean="0"/>
-              <a:t>6/7/2019</a:t>
+              <a:t>6/10/2019</a:t>
             </a:fld>
             <a:endParaRPr lang="en-US"/>
           </a:p>
@@ -1606,7 +1606,7 @@
           <a:p>
             <a:fld id="{0BE11D4F-DB33-4DA7-996A-B7BA98720CF3}" type="datetimeFigureOut">
               <a:rPr lang="en-US" smtClean="0"/>
-              <a:t>6/7/2019</a:t>
+              <a:t>6/10/2019</a:t>
             </a:fld>
             <a:endParaRPr lang="en-US"/>
           </a:p>
@@ -1724,7 +1724,7 @@
           <a:p>
             <a:fld id="{0BE11D4F-DB33-4DA7-996A-B7BA98720CF3}" type="datetimeFigureOut">
               <a:rPr lang="en-US" smtClean="0"/>
-              <a:t>6/7/2019</a:t>
+              <a:t>6/10/2019</a:t>
             </a:fld>
             <a:endParaRPr lang="en-US"/>
           </a:p>
@@ -1819,7 +1819,7 @@
           <a:p>
             <a:fld id="{0BE11D4F-DB33-4DA7-996A-B7BA98720CF3}" type="datetimeFigureOut">
               <a:rPr lang="en-US" smtClean="0"/>
-              <a:t>6/7/2019</a:t>
+              <a:t>6/10/2019</a:t>
             </a:fld>
             <a:endParaRPr lang="en-US"/>
           </a:p>
@@ -2096,7 +2096,7 @@
           <a:p>
             <a:fld id="{0BE11D4F-DB33-4DA7-996A-B7BA98720CF3}" type="datetimeFigureOut">
               <a:rPr lang="en-US" smtClean="0"/>
-              <a:t>6/7/2019</a:t>
+              <a:t>6/10/2019</a:t>
             </a:fld>
             <a:endParaRPr lang="en-US"/>
           </a:p>
@@ -2353,7 +2353,7 @@
           <a:p>
             <a:fld id="{0BE11D4F-DB33-4DA7-996A-B7BA98720CF3}" type="datetimeFigureOut">
               <a:rPr lang="en-US" smtClean="0"/>
-              <a:t>6/7/2019</a:t>
+              <a:t>6/10/2019</a:t>
             </a:fld>
             <a:endParaRPr lang="en-US"/>
           </a:p>
@@ -2566,7 +2566,7 @@
           <a:p>
             <a:fld id="{0BE11D4F-DB33-4DA7-996A-B7BA98720CF3}" type="datetimeFigureOut">
               <a:rPr lang="en-US" smtClean="0"/>
-              <a:t>6/7/2019</a:t>
+              <a:t>6/10/2019</a:t>
             </a:fld>
             <a:endParaRPr lang="en-US"/>
           </a:p>
@@ -3184,8 +3184,11 @@
           <a:bodyPr rtlCol="0" anchor="ctr"/>
           <a:lstStyle/>
           <a:p>
-            <a:pPr algn="ctr"/>
-            <a:endParaRPr lang="en-US"/>
+            <a:endParaRPr lang="en-US" sz="3600" dirty="0">
+              <a:solidFill>
+                <a:schemeClr val="tx1"/>
+              </a:solidFill>
+            </a:endParaRPr>
           </a:p>
         </p:txBody>
       </p:sp>
@@ -3708,8 +3711,8 @@
         </p:blipFill>
         <p:spPr>
           <a:xfrm rot="20041000">
-            <a:off x="11955444" y="7119656"/>
-            <a:ext cx="4919666" cy="2618657"/>
+            <a:off x="12216401" y="6587261"/>
+            <a:ext cx="4932051" cy="2625249"/>
           </a:xfrm>
           <a:prstGeom prst="rect">
             <a:avLst/>
@@ -3763,7 +3766,7 @@
         <p:spPr>
           <a:xfrm>
             <a:off x="17221549" y="27387916"/>
-            <a:ext cx="18530560" cy="3416320"/>
+            <a:ext cx="18530560" cy="2308324"/>
           </a:xfrm>
           <a:prstGeom prst="rect">
             <a:avLst/>
@@ -3803,16 +3806,6 @@
             <a:r>
               <a:rPr lang="en-US" sz="3600" dirty="0"/>
               <a:t>Create Python package for data cleaning to minimize the need for ArcMap</a:t>
-            </a:r>
-          </a:p>
-          <a:p>
-            <a:pPr marL="571500" indent="-571500">
-              <a:buFont typeface="Arial" panose="020B0604020202020204" pitchFamily="34" charset="0"/>
-              <a:buChar char="•"/>
-            </a:pPr>
-            <a:r>
-              <a:rPr lang="en-US" sz="3600" dirty="0"/>
-              <a:t>Add more stress parameters (mass, velocity, acceleration, weather conditions) to get a better estimate of battery fatigue</a:t>
             </a:r>
           </a:p>
         </p:txBody>
@@ -4056,6 +4049,356 @@
               </a:srgbClr>
             </a:outerShdw>
           </a:effectLst>
+        </p:spPr>
+      </p:pic>
+      <p:sp>
+        <p:nvSpPr>
+          <p:cNvPr id="2" name="TextBox 1">
+            <a:extLst>
+              <a:ext uri="{FF2B5EF4-FFF2-40B4-BE49-F238E27FC236}">
+                <a16:creationId xmlns:a16="http://schemas.microsoft.com/office/drawing/2014/main" id="{58D58EE5-692F-4287-A28A-93410A6FCB55}"/>
+              </a:ext>
+            </a:extLst>
+          </p:cNvPr>
+          <p:cNvSpPr txBox="1"/>
+          <p:nvPr/>
+        </p:nvSpPr>
+        <p:spPr>
+          <a:xfrm>
+            <a:off x="950892" y="6174324"/>
+            <a:ext cx="11744382" cy="4585871"/>
+          </a:xfrm>
+          <a:prstGeom prst="rect">
+            <a:avLst/>
+          </a:prstGeom>
+          <a:noFill/>
+        </p:spPr>
+        <p:txBody>
+          <a:bodyPr wrap="square" rtlCol="0">
+            <a:spAutoFit/>
+          </a:bodyPr>
+          <a:lstStyle/>
+          <a:p>
+            <a:pPr marL="571500" indent="-571500">
+              <a:buFont typeface="Arial" panose="020B0604020202020204" pitchFamily="34" charset="0"/>
+              <a:buChar char="•"/>
+            </a:pPr>
+            <a:r>
+              <a:rPr lang="en-US" sz="3200" dirty="0"/>
+              <a:t>King County Metro is transitioning to a fully electrified fleet, including diesel hybrid-electric, electric trolleys, and battery-electric vehicles.</a:t>
+            </a:r>
+          </a:p>
+          <a:p>
+            <a:pPr marL="571500" indent="-571500">
+              <a:buFont typeface="Arial" panose="020B0604020202020204" pitchFamily="34" charset="0"/>
+              <a:buChar char="•"/>
+            </a:pPr>
+            <a:r>
+              <a:rPr lang="en-US" sz="3200" dirty="0"/>
+              <a:t>Metro’s battery maintenance protocol is currently reactive.</a:t>
+            </a:r>
+          </a:p>
+          <a:p>
+            <a:pPr marL="571500" indent="-571500">
+              <a:buFont typeface="Arial" panose="020B0604020202020204" pitchFamily="34" charset="0"/>
+              <a:buChar char="•"/>
+            </a:pPr>
+            <a:r>
+              <a:rPr lang="en-US" sz="3200" dirty="0"/>
+              <a:t>The vehicle drive train, drive cycle, and route characteristics are not considered in battery replacement and route planning. </a:t>
+            </a:r>
+          </a:p>
+          <a:p>
+            <a:pPr marL="571500" indent="-571500">
+              <a:buFont typeface="Arial" panose="020B0604020202020204" pitchFamily="34" charset="0"/>
+              <a:buChar char="•"/>
+            </a:pPr>
+            <a:r>
+              <a:rPr lang="en-US" sz="3200" dirty="0"/>
+              <a:t>There is an opportunity to lower costs using a predictive maintenance model </a:t>
+            </a:r>
+          </a:p>
+          <a:p>
+            <a:pPr marL="571500" indent="-571500">
+              <a:buFont typeface="Arial" panose="020B0604020202020204" pitchFamily="34" charset="0"/>
+              <a:buChar char="•"/>
+            </a:pPr>
+            <a:endParaRPr lang="en-US" sz="3600" dirty="0"/>
+          </a:p>
+        </p:txBody>
+      </p:sp>
+      <p:pic>
+        <p:nvPicPr>
+          <p:cNvPr id="27" name="Picture 26">
+            <a:extLst>
+              <a:ext uri="{FF2B5EF4-FFF2-40B4-BE49-F238E27FC236}">
+                <a16:creationId xmlns:a16="http://schemas.microsoft.com/office/drawing/2014/main" id="{C2CCF213-FF4E-4FC3-B049-8131C70A8F7C}"/>
+              </a:ext>
+            </a:extLst>
+          </p:cNvPr>
+          <p:cNvPicPr>
+            <a:picLocks noChangeAspect="1"/>
+          </p:cNvPicPr>
+          <p:nvPr/>
+        </p:nvPicPr>
+        <p:blipFill>
+          <a:blip r:embed="rId7">
+            <a:extLst>
+              <a:ext uri="{BEBA8EAE-BF5A-486C-A8C5-ECC9F3942E4B}">
+                <a14:imgProps xmlns:a14="http://schemas.microsoft.com/office/drawing/2010/main">
+                  <a14:imgLayer r:embed="rId8">
+                    <a14:imgEffect>
+                      <a14:backgroundRemoval t="0" b="100000" l="1600" r="100000">
+                        <a14:foregroundMark x1="32200" y1="2607" x2="74200" y2="10736"/>
+                      </a14:backgroundRemoval>
+                    </a14:imgEffect>
+                  </a14:imgLayer>
+                </a14:imgProps>
+              </a:ext>
+              <a:ext uri="{28A0092B-C50C-407E-A947-70E740481C1C}">
+                <a14:useLocalDpi xmlns:a14="http://schemas.microsoft.com/office/drawing/2010/main" val="0"/>
+              </a:ext>
+            </a:extLst>
+          </a:blip>
+          <a:stretch>
+            <a:fillRect/>
+          </a:stretch>
+        </p:blipFill>
+        <p:spPr>
+          <a:xfrm>
+            <a:off x="861063" y="25432508"/>
+            <a:ext cx="3920972" cy="5112948"/>
+          </a:xfrm>
+          <a:prstGeom prst="rect">
+            <a:avLst/>
+          </a:prstGeom>
+        </p:spPr>
+      </p:pic>
+      <p:pic>
+        <p:nvPicPr>
+          <p:cNvPr id="28" name="Picture 2" descr="1280px-King_County_Metro_logo.svg.png (1280Ã458)">
+            <a:extLst>
+              <a:ext uri="{FF2B5EF4-FFF2-40B4-BE49-F238E27FC236}">
+                <a16:creationId xmlns:a16="http://schemas.microsoft.com/office/drawing/2014/main" id="{E54C2D08-D339-4435-BA3B-776080462554}"/>
+              </a:ext>
+            </a:extLst>
+          </p:cNvPr>
+          <p:cNvPicPr>
+            <a:picLocks noChangeAspect="1" noChangeArrowheads="1"/>
+          </p:cNvPicPr>
+          <p:nvPr/>
+        </p:nvPicPr>
+        <p:blipFill>
+          <a:blip r:embed="rId9" cstate="hqprint">
+            <a:extLst>
+              <a:ext uri="{28A0092B-C50C-407E-A947-70E740481C1C}">
+                <a14:useLocalDpi xmlns:a14="http://schemas.microsoft.com/office/drawing/2010/main" val="0"/>
+              </a:ext>
+            </a:extLst>
+          </a:blip>
+          <a:srcRect/>
+          <a:stretch>
+            <a:fillRect/>
+          </a:stretch>
+        </p:blipFill>
+        <p:spPr bwMode="auto">
+          <a:xfrm>
+            <a:off x="1129306" y="24228524"/>
+            <a:ext cx="3098908" cy="1108828"/>
+          </a:xfrm>
+          <a:prstGeom prst="rect">
+            <a:avLst/>
+          </a:prstGeom>
+          <a:noFill/>
+          <a:extLst>
+            <a:ext uri="{909E8E84-426E-40DD-AFC4-6F175D3DCCD1}">
+              <a14:hiddenFill xmlns:a14="http://schemas.microsoft.com/office/drawing/2010/main">
+                <a:solidFill>
+                  <a:srgbClr val="FFFFFF"/>
+                </a:solidFill>
+              </a14:hiddenFill>
+            </a:ext>
+          </a:extLst>
+        </p:spPr>
+      </p:pic>
+      <p:pic>
+        <p:nvPicPr>
+          <p:cNvPr id="29" name="Picture 4" descr="DNR.png (254Ã254)">
+            <a:extLst>
+              <a:ext uri="{FF2B5EF4-FFF2-40B4-BE49-F238E27FC236}">
+                <a16:creationId xmlns:a16="http://schemas.microsoft.com/office/drawing/2014/main" id="{1EFE09B8-7B03-4A3E-B15D-617F2970B4A9}"/>
+              </a:ext>
+            </a:extLst>
+          </p:cNvPr>
+          <p:cNvPicPr>
+            <a:picLocks noChangeAspect="1" noChangeArrowheads="1"/>
+          </p:cNvPicPr>
+          <p:nvPr/>
+        </p:nvPicPr>
+        <p:blipFill>
+          <a:blip r:embed="rId10">
+            <a:extLst>
+              <a:ext uri="{BEBA8EAE-BF5A-486C-A8C5-ECC9F3942E4B}">
+                <a14:imgProps xmlns:a14="http://schemas.microsoft.com/office/drawing/2010/main">
+                  <a14:imgLayer r:embed="rId11">
+                    <a14:imgEffect>
+                      <a14:backgroundRemoval t="10000" b="90000" l="10000" r="90000">
+                        <a14:foregroundMark x1="51181" y1="61417" x2="49213" y2="66142"/>
+                      </a14:backgroundRemoval>
+                    </a14:imgEffect>
+                  </a14:imgLayer>
+                </a14:imgProps>
+              </a:ext>
+              <a:ext uri="{28A0092B-C50C-407E-A947-70E740481C1C}">
+                <a14:useLocalDpi xmlns:a14="http://schemas.microsoft.com/office/drawing/2010/main" val="0"/>
+              </a:ext>
+            </a:extLst>
+          </a:blip>
+          <a:srcRect/>
+          <a:stretch>
+            <a:fillRect/>
+          </a:stretch>
+        </p:blipFill>
+        <p:spPr bwMode="auto">
+          <a:xfrm>
+            <a:off x="4228214" y="24088679"/>
+            <a:ext cx="2171417" cy="2171417"/>
+          </a:xfrm>
+          <a:prstGeom prst="rect">
+            <a:avLst/>
+          </a:prstGeom>
+          <a:noFill/>
+          <a:extLst>
+            <a:ext uri="{909E8E84-426E-40DD-AFC4-6F175D3DCCD1}">
+              <a14:hiddenFill xmlns:a14="http://schemas.microsoft.com/office/drawing/2010/main">
+                <a:solidFill>
+                  <a:srgbClr val="FFFFFF"/>
+                </a:solidFill>
+              </a14:hiddenFill>
+            </a:ext>
+          </a:extLst>
+        </p:spPr>
+      </p:pic>
+      <p:sp>
+        <p:nvSpPr>
+          <p:cNvPr id="30" name="TextBox 29">
+            <a:extLst>
+              <a:ext uri="{FF2B5EF4-FFF2-40B4-BE49-F238E27FC236}">
+                <a16:creationId xmlns:a16="http://schemas.microsoft.com/office/drawing/2014/main" id="{1AF12DF7-C4CF-4E34-BCDB-E8D7DB9B8339}"/>
+              </a:ext>
+            </a:extLst>
+          </p:cNvPr>
+          <p:cNvSpPr txBox="1"/>
+          <p:nvPr/>
+        </p:nvSpPr>
+        <p:spPr>
+          <a:xfrm>
+            <a:off x="950891" y="30400764"/>
+            <a:ext cx="5744628" cy="584775"/>
+          </a:xfrm>
+          <a:prstGeom prst="rect">
+            <a:avLst/>
+          </a:prstGeom>
+          <a:noFill/>
+        </p:spPr>
+        <p:txBody>
+          <a:bodyPr wrap="square" rtlCol="0">
+            <a:spAutoFit/>
+          </a:bodyPr>
+          <a:lstStyle/>
+          <a:p>
+            <a:r>
+              <a:rPr lang="en-US" sz="3200" dirty="0"/>
+              <a:t>Bus routes: Shapefile (.</a:t>
+            </a:r>
+            <a:r>
+              <a:rPr lang="en-US" sz="3200" dirty="0" err="1"/>
+              <a:t>shp</a:t>
+            </a:r>
+            <a:r>
+              <a:rPr lang="en-US" sz="3200" dirty="0"/>
+              <a:t>) [1]</a:t>
+            </a:r>
+          </a:p>
+        </p:txBody>
+      </p:sp>
+      <p:sp>
+        <p:nvSpPr>
+          <p:cNvPr id="31" name="TextBox 30">
+            <a:extLst>
+              <a:ext uri="{FF2B5EF4-FFF2-40B4-BE49-F238E27FC236}">
+                <a16:creationId xmlns:a16="http://schemas.microsoft.com/office/drawing/2014/main" id="{F20073ED-C074-4EAA-9FF9-76B31BFE129A}"/>
+              </a:ext>
+            </a:extLst>
+          </p:cNvPr>
+          <p:cNvSpPr txBox="1"/>
+          <p:nvPr/>
+        </p:nvSpPr>
+        <p:spPr>
+          <a:xfrm>
+            <a:off x="950891" y="31016316"/>
+            <a:ext cx="4995734" cy="584775"/>
+          </a:xfrm>
+          <a:prstGeom prst="rect">
+            <a:avLst/>
+          </a:prstGeom>
+          <a:noFill/>
+        </p:spPr>
+        <p:txBody>
+          <a:bodyPr wrap="square" rtlCol="0">
+            <a:spAutoFit/>
+          </a:bodyPr>
+          <a:lstStyle/>
+          <a:p>
+            <a:r>
+              <a:rPr lang="en-US" sz="3200" dirty="0"/>
+              <a:t>Elevation: Raster file (.</a:t>
+            </a:r>
+            <a:r>
+              <a:rPr lang="en-US" sz="3200" dirty="0" err="1"/>
+              <a:t>tif</a:t>
+            </a:r>
+            <a:r>
+              <a:rPr lang="en-US" sz="3200" dirty="0"/>
+              <a:t>) [2]</a:t>
+            </a:r>
+          </a:p>
+        </p:txBody>
+      </p:sp>
+      <p:pic>
+        <p:nvPicPr>
+          <p:cNvPr id="17" name="Picture 16">
+            <a:extLst>
+              <a:ext uri="{FF2B5EF4-FFF2-40B4-BE49-F238E27FC236}">
+                <a16:creationId xmlns:a16="http://schemas.microsoft.com/office/drawing/2014/main" id="{5C77ACAD-C089-4353-9397-D0F927FE00A2}"/>
+              </a:ext>
+            </a:extLst>
+          </p:cNvPr>
+          <p:cNvPicPr>
+            <a:picLocks noChangeAspect="1"/>
+          </p:cNvPicPr>
+          <p:nvPr/>
+        </p:nvPicPr>
+        <p:blipFill>
+          <a:blip r:embed="rId12">
+            <a:extLst>
+              <a:ext uri="{28A0092B-C50C-407E-A947-70E740481C1C}">
+                <a14:useLocalDpi xmlns:a14="http://schemas.microsoft.com/office/drawing/2010/main" val="0"/>
+              </a:ext>
+            </a:extLst>
+          </a:blip>
+          <a:stretch>
+            <a:fillRect/>
+          </a:stretch>
+        </p:blipFill>
+        <p:spPr>
+          <a:xfrm>
+            <a:off x="764390" y="12300118"/>
+            <a:ext cx="15587580" cy="7952040"/>
+          </a:xfrm>
+          <a:prstGeom prst="rect">
+            <a:avLst/>
+          </a:prstGeom>
         </p:spPr>
       </p:pic>
     </p:spTree>

</xml_diff>

<commit_message>
Added new flow chart to poster
</commit_message>
<xml_diff>
--- a/Documentation/metromojo_poster.pptx
+++ b/Documentation/metromojo_poster.pptx
@@ -3324,7 +3324,7 @@
             <a:pPr algn="ctr"/>
             <a:r>
               <a:rPr lang="en-US" sz="4400" dirty="0"/>
-              <a:t>Work Flow / Packages</a:t>
+              <a:t>Package Overview</a:t>
             </a:r>
           </a:p>
         </p:txBody>
@@ -4367,10 +4367,10 @@
       </p:sp>
       <p:pic>
         <p:nvPicPr>
-          <p:cNvPr id="17" name="Picture 16">
+          <p:cNvPr id="18" name="Picture 17">
             <a:extLst>
               <a:ext uri="{FF2B5EF4-FFF2-40B4-BE49-F238E27FC236}">
-                <a16:creationId xmlns:a16="http://schemas.microsoft.com/office/drawing/2014/main" id="{5C77ACAD-C089-4353-9397-D0F927FE00A2}"/>
+                <a16:creationId xmlns:a16="http://schemas.microsoft.com/office/drawing/2014/main" id="{99237784-C9F7-42A9-9B33-9EA9D453089B}"/>
               </a:ext>
             </a:extLst>
           </p:cNvPr>
@@ -4380,7 +4380,80 @@
           <p:nvPr/>
         </p:nvPicPr>
         <p:blipFill>
-          <a:blip r:embed="rId12">
+          <a:blip r:embed="rId12"/>
+          <a:stretch>
+            <a:fillRect/>
+          </a:stretch>
+        </p:blipFill>
+        <p:spPr>
+          <a:xfrm>
+            <a:off x="6079192" y="27026691"/>
+            <a:ext cx="4747736" cy="3058486"/>
+          </a:xfrm>
+          <a:prstGeom prst="rect">
+            <a:avLst/>
+          </a:prstGeom>
+        </p:spPr>
+      </p:pic>
+      <p:sp>
+        <p:nvSpPr>
+          <p:cNvPr id="35" name="TextBox 34">
+            <a:extLst>
+              <a:ext uri="{FF2B5EF4-FFF2-40B4-BE49-F238E27FC236}">
+                <a16:creationId xmlns:a16="http://schemas.microsoft.com/office/drawing/2014/main" id="{CBCFF0F5-600E-4DE5-B67D-D591D427E45F}"/>
+              </a:ext>
+            </a:extLst>
+          </p:cNvPr>
+          <p:cNvSpPr txBox="1"/>
+          <p:nvPr/>
+        </p:nvSpPr>
+        <p:spPr>
+          <a:xfrm>
+            <a:off x="6107348" y="30388560"/>
+            <a:ext cx="5388949" cy="596979"/>
+          </a:xfrm>
+          <a:prstGeom prst="rect">
+            <a:avLst/>
+          </a:prstGeom>
+          <a:noFill/>
+        </p:spPr>
+        <p:txBody>
+          <a:bodyPr wrap="square" rtlCol="0">
+            <a:spAutoFit/>
+          </a:bodyPr>
+          <a:lstStyle/>
+          <a:p>
+            <a:r>
+              <a:rPr lang="en-US" sz="3200" dirty="0"/>
+              <a:t>Bus stops: Shapefile (.</a:t>
+            </a:r>
+            <a:r>
+              <a:rPr lang="en-US" sz="3200" dirty="0" err="1"/>
+              <a:t>shp</a:t>
+            </a:r>
+            <a:r>
+              <a:rPr lang="en-US" sz="3200" dirty="0"/>
+              <a:t>) [3]</a:t>
+            </a:r>
+          </a:p>
+        </p:txBody>
+      </p:sp>
+      <p:pic>
+        <p:nvPicPr>
+          <p:cNvPr id="22" name="Picture 21">
+            <a:extLst>
+              <a:ext uri="{FF2B5EF4-FFF2-40B4-BE49-F238E27FC236}">
+                <a16:creationId xmlns:a16="http://schemas.microsoft.com/office/drawing/2014/main" id="{17C56CB8-2F86-4E1A-A94C-0EEFCF68A6C4}"/>
+              </a:ext>
+            </a:extLst>
+          </p:cNvPr>
+          <p:cNvPicPr>
+            <a:picLocks noChangeAspect="1"/>
+          </p:cNvPicPr>
+          <p:nvPr/>
+        </p:nvPicPr>
+        <p:blipFill>
+          <a:blip r:embed="rId13">
             <a:extLst>
               <a:ext uri="{28A0092B-C50C-407E-A947-70E740481C1C}">
                 <a14:useLocalDpi xmlns:a14="http://schemas.microsoft.com/office/drawing/2010/main" val="0"/>
@@ -4393,14 +4466,49 @@
         </p:blipFill>
         <p:spPr>
           <a:xfrm>
-            <a:off x="764390" y="12300118"/>
-            <a:ext cx="15587580" cy="7952040"/>
+            <a:off x="1463907" y="12324949"/>
+            <a:ext cx="13978305" cy="10490462"/>
           </a:xfrm>
           <a:prstGeom prst="rect">
             <a:avLst/>
           </a:prstGeom>
         </p:spPr>
       </p:pic>
+      <p:sp>
+        <p:nvSpPr>
+          <p:cNvPr id="23" name="TextBox 22">
+            <a:extLst>
+              <a:ext uri="{FF2B5EF4-FFF2-40B4-BE49-F238E27FC236}">
+                <a16:creationId xmlns:a16="http://schemas.microsoft.com/office/drawing/2014/main" id="{E4DCF014-3A3B-46FC-8357-4F07F2CA8E2B}"/>
+              </a:ext>
+            </a:extLst>
+          </p:cNvPr>
+          <p:cNvSpPr txBox="1"/>
+          <p:nvPr/>
+        </p:nvSpPr>
+        <p:spPr>
+          <a:xfrm>
+            <a:off x="11850650" y="27988982"/>
+            <a:ext cx="4484062" cy="830997"/>
+          </a:xfrm>
+          <a:prstGeom prst="rect">
+            <a:avLst/>
+          </a:prstGeom>
+          <a:noFill/>
+        </p:spPr>
+        <p:txBody>
+          <a:bodyPr wrap="square" rtlCol="0">
+            <a:spAutoFit/>
+          </a:bodyPr>
+          <a:lstStyle/>
+          <a:p>
+            <a:r>
+              <a:rPr lang="en-US" sz="4800" dirty="0"/>
+              <a:t>Ridership Plot</a:t>
+            </a:r>
+          </a:p>
+        </p:txBody>
+      </p:sp>
     </p:spTree>
     <p:extLst>
       <p:ext uri="{BB962C8B-B14F-4D97-AF65-F5344CB8AC3E}">

</xml_diff>

<commit_message>
New poster draft: added ridership plots
</commit_message>
<xml_diff>
--- a/Documentation/metromojo_poster.pptx
+++ b/Documentation/metromojo_poster.pptx
@@ -243,7 +243,7 @@
           <a:p>
             <a:fld id="{0BE11D4F-DB33-4DA7-996A-B7BA98720CF3}" type="datetimeFigureOut">
               <a:rPr lang="en-US" smtClean="0"/>
-              <a:t>6/10/2019</a:t>
+              <a:t>6/18/2019</a:t>
             </a:fld>
             <a:endParaRPr lang="en-US"/>
           </a:p>
@@ -413,7 +413,7 @@
           <a:p>
             <a:fld id="{0BE11D4F-DB33-4DA7-996A-B7BA98720CF3}" type="datetimeFigureOut">
               <a:rPr lang="en-US" smtClean="0"/>
-              <a:t>6/10/2019</a:t>
+              <a:t>6/18/2019</a:t>
             </a:fld>
             <a:endParaRPr lang="en-US"/>
           </a:p>
@@ -593,7 +593,7 @@
           <a:p>
             <a:fld id="{0BE11D4F-DB33-4DA7-996A-B7BA98720CF3}" type="datetimeFigureOut">
               <a:rPr lang="en-US" smtClean="0"/>
-              <a:t>6/10/2019</a:t>
+              <a:t>6/18/2019</a:t>
             </a:fld>
             <a:endParaRPr lang="en-US"/>
           </a:p>
@@ -763,7 +763,7 @@
           <a:p>
             <a:fld id="{0BE11D4F-DB33-4DA7-996A-B7BA98720CF3}" type="datetimeFigureOut">
               <a:rPr lang="en-US" smtClean="0"/>
-              <a:t>6/10/2019</a:t>
+              <a:t>6/18/2019</a:t>
             </a:fld>
             <a:endParaRPr lang="en-US"/>
           </a:p>
@@ -1007,7 +1007,7 @@
           <a:p>
             <a:fld id="{0BE11D4F-DB33-4DA7-996A-B7BA98720CF3}" type="datetimeFigureOut">
               <a:rPr lang="en-US" smtClean="0"/>
-              <a:t>6/10/2019</a:t>
+              <a:t>6/18/2019</a:t>
             </a:fld>
             <a:endParaRPr lang="en-US"/>
           </a:p>
@@ -1239,7 +1239,7 @@
           <a:p>
             <a:fld id="{0BE11D4F-DB33-4DA7-996A-B7BA98720CF3}" type="datetimeFigureOut">
               <a:rPr lang="en-US" smtClean="0"/>
-              <a:t>6/10/2019</a:t>
+              <a:t>6/18/2019</a:t>
             </a:fld>
             <a:endParaRPr lang="en-US"/>
           </a:p>
@@ -1606,7 +1606,7 @@
           <a:p>
             <a:fld id="{0BE11D4F-DB33-4DA7-996A-B7BA98720CF3}" type="datetimeFigureOut">
               <a:rPr lang="en-US" smtClean="0"/>
-              <a:t>6/10/2019</a:t>
+              <a:t>6/18/2019</a:t>
             </a:fld>
             <a:endParaRPr lang="en-US"/>
           </a:p>
@@ -1724,7 +1724,7 @@
           <a:p>
             <a:fld id="{0BE11D4F-DB33-4DA7-996A-B7BA98720CF3}" type="datetimeFigureOut">
               <a:rPr lang="en-US" smtClean="0"/>
-              <a:t>6/10/2019</a:t>
+              <a:t>6/18/2019</a:t>
             </a:fld>
             <a:endParaRPr lang="en-US"/>
           </a:p>
@@ -1819,7 +1819,7 @@
           <a:p>
             <a:fld id="{0BE11D4F-DB33-4DA7-996A-B7BA98720CF3}" type="datetimeFigureOut">
               <a:rPr lang="en-US" smtClean="0"/>
-              <a:t>6/10/2019</a:t>
+              <a:t>6/18/2019</a:t>
             </a:fld>
             <a:endParaRPr lang="en-US"/>
           </a:p>
@@ -2096,7 +2096,7 @@
           <a:p>
             <a:fld id="{0BE11D4F-DB33-4DA7-996A-B7BA98720CF3}" type="datetimeFigureOut">
               <a:rPr lang="en-US" smtClean="0"/>
-              <a:t>6/10/2019</a:t>
+              <a:t>6/18/2019</a:t>
             </a:fld>
             <a:endParaRPr lang="en-US"/>
           </a:p>
@@ -2353,7 +2353,7 @@
           <a:p>
             <a:fld id="{0BE11D4F-DB33-4DA7-996A-B7BA98720CF3}" type="datetimeFigureOut">
               <a:rPr lang="en-US" smtClean="0"/>
-              <a:t>6/10/2019</a:t>
+              <a:t>6/18/2019</a:t>
             </a:fld>
             <a:endParaRPr lang="en-US"/>
           </a:p>
@@ -2566,7 +2566,7 @@
           <a:p>
             <a:fld id="{0BE11D4F-DB33-4DA7-996A-B7BA98720CF3}" type="datetimeFigureOut">
               <a:rPr lang="en-US" smtClean="0"/>
-              <a:t>6/10/2019</a:t>
+              <a:t>6/18/2019</a:t>
             </a:fld>
             <a:endParaRPr lang="en-US"/>
           </a:p>
@@ -3007,57 +3007,6 @@
       </p:grpSpPr>
       <p:sp>
         <p:nvSpPr>
-          <p:cNvPr id="25" name="Rounded Rectangle 5">
-            <a:extLst>
-              <a:ext uri="{FF2B5EF4-FFF2-40B4-BE49-F238E27FC236}">
-                <a16:creationId xmlns:a16="http://schemas.microsoft.com/office/drawing/2014/main" id="{4EA5DE83-C1D6-4F27-ABE8-BD5F93CFDE86}"/>
-              </a:ext>
-            </a:extLst>
-          </p:cNvPr>
-          <p:cNvSpPr/>
-          <p:nvPr/>
-        </p:nvSpPr>
-        <p:spPr>
-          <a:xfrm>
-            <a:off x="-16114248" y="12483179"/>
-            <a:ext cx="15881521" cy="7952041"/>
-          </a:xfrm>
-          <a:prstGeom prst="roundRect">
-            <a:avLst>
-              <a:gd name="adj" fmla="val 0"/>
-            </a:avLst>
-          </a:prstGeom>
-          <a:solidFill>
-            <a:schemeClr val="bg1"/>
-          </a:solidFill>
-        </p:spPr>
-        <p:style>
-          <a:lnRef idx="2">
-            <a:schemeClr val="accent1">
-              <a:shade val="50000"/>
-            </a:schemeClr>
-          </a:lnRef>
-          <a:fillRef idx="1">
-            <a:schemeClr val="accent1"/>
-          </a:fillRef>
-          <a:effectRef idx="0">
-            <a:schemeClr val="accent1"/>
-          </a:effectRef>
-          <a:fontRef idx="minor">
-            <a:schemeClr val="lt1"/>
-          </a:fontRef>
-        </p:style>
-        <p:txBody>
-          <a:bodyPr rtlCol="0" anchor="ctr"/>
-          <a:lstStyle/>
-          <a:p>
-            <a:pPr algn="ctr"/>
-            <a:endParaRPr lang="en-US" dirty="0"/>
-          </a:p>
-        </p:txBody>
-      </p:sp>
-      <p:sp>
-        <p:nvSpPr>
           <p:cNvPr id="6" name="TextBox 5">
             <a:extLst>
               <a:ext uri="{FF2B5EF4-FFF2-40B4-BE49-F238E27FC236}">
@@ -3723,7 +3672,7 @@
         <p:spPr>
           <a:xfrm>
             <a:off x="19507549" y="27525264"/>
-            <a:ext cx="18530560" cy="2308324"/>
+            <a:ext cx="18530560" cy="2862322"/>
           </a:xfrm>
           <a:prstGeom prst="rect">
             <a:avLst/>
@@ -3742,7 +3691,7 @@
             </a:pPr>
             <a:r>
               <a:rPr lang="en-US" sz="3600" dirty="0"/>
-              <a:t>Add more points (e.g. interpolation) for higher resolution along the route for a smoother elevation profile and more accurate ranking metric</a:t>
+              <a:t>Add more points (e.g. interpolation) for higher resolution along the route for a smoother elevation profile and load profiles</a:t>
             </a:r>
           </a:p>
           <a:p>
@@ -3762,7 +3711,17 @@
             </a:pPr>
             <a:r>
               <a:rPr lang="en-US" sz="3600" dirty="0"/>
-              <a:t>Create Python package for data cleaning to minimize the need for ArcMap</a:t>
+              <a:t>Create package module for data cleaning to minimize the need for ArcMap</a:t>
+            </a:r>
+          </a:p>
+          <a:p>
+            <a:pPr marL="571500" indent="-571500">
+              <a:buFont typeface="Arial" panose="020B0604020202020204" pitchFamily="34" charset="0"/>
+              <a:buChar char="•"/>
+            </a:pPr>
+            <a:r>
+              <a:rPr lang="en-US" sz="3600" dirty="0"/>
+              <a:t>Create a database that links load profiles to specific routes, bus IDs, and module IDs</a:t>
             </a:r>
           </a:p>
         </p:txBody>
@@ -4123,7 +4082,7 @@
         </p:blipFill>
         <p:spPr>
           <a:xfrm>
-            <a:off x="4485803" y="12498546"/>
+            <a:off x="4058518" y="12498546"/>
             <a:ext cx="2768673" cy="3610350"/>
           </a:xfrm>
           <a:prstGeom prst="rect">
@@ -4236,92 +4195,6 @@
           </a:extLst>
         </p:spPr>
       </p:pic>
-      <p:sp>
-        <p:nvSpPr>
-          <p:cNvPr id="30" name="TextBox 29">
-            <a:extLst>
-              <a:ext uri="{FF2B5EF4-FFF2-40B4-BE49-F238E27FC236}">
-                <a16:creationId xmlns:a16="http://schemas.microsoft.com/office/drawing/2014/main" id="{1AF12DF7-C4CF-4E34-BCDB-E8D7DB9B8339}"/>
-              </a:ext>
-            </a:extLst>
-          </p:cNvPr>
-          <p:cNvSpPr txBox="1"/>
-          <p:nvPr/>
-        </p:nvSpPr>
-        <p:spPr>
-          <a:xfrm>
-            <a:off x="-14303393" y="12599093"/>
-            <a:ext cx="5744628" cy="584775"/>
-          </a:xfrm>
-          <a:prstGeom prst="rect">
-            <a:avLst/>
-          </a:prstGeom>
-          <a:noFill/>
-        </p:spPr>
-        <p:txBody>
-          <a:bodyPr wrap="square" rtlCol="0">
-            <a:spAutoFit/>
-          </a:bodyPr>
-          <a:lstStyle/>
-          <a:p>
-            <a:r>
-              <a:rPr lang="en-US" sz="3200" dirty="0"/>
-              <a:t>Bus routes: Shapefile (.</a:t>
-            </a:r>
-            <a:r>
-              <a:rPr lang="en-US" sz="3200" dirty="0" err="1"/>
-              <a:t>shp</a:t>
-            </a:r>
-            <a:r>
-              <a:rPr lang="en-US" sz="3200" dirty="0"/>
-              <a:t>) [1]</a:t>
-            </a:r>
-          </a:p>
-        </p:txBody>
-      </p:sp>
-      <p:sp>
-        <p:nvSpPr>
-          <p:cNvPr id="31" name="TextBox 30">
-            <a:extLst>
-              <a:ext uri="{FF2B5EF4-FFF2-40B4-BE49-F238E27FC236}">
-                <a16:creationId xmlns:a16="http://schemas.microsoft.com/office/drawing/2014/main" id="{F20073ED-C074-4EAA-9FF9-76B31BFE129A}"/>
-              </a:ext>
-            </a:extLst>
-          </p:cNvPr>
-          <p:cNvSpPr txBox="1"/>
-          <p:nvPr/>
-        </p:nvSpPr>
-        <p:spPr>
-          <a:xfrm>
-            <a:off x="-16764339" y="13460820"/>
-            <a:ext cx="4995734" cy="584775"/>
-          </a:xfrm>
-          <a:prstGeom prst="rect">
-            <a:avLst/>
-          </a:prstGeom>
-          <a:noFill/>
-        </p:spPr>
-        <p:txBody>
-          <a:bodyPr wrap="square" rtlCol="0">
-            <a:spAutoFit/>
-          </a:bodyPr>
-          <a:lstStyle/>
-          <a:p>
-            <a:r>
-              <a:rPr lang="en-US" sz="3200" dirty="0"/>
-              <a:t>Elevation: Raster file (.</a:t>
-            </a:r>
-            <a:r>
-              <a:rPr lang="en-US" sz="3200" dirty="0" err="1"/>
-              <a:t>tif</a:t>
-            </a:r>
-            <a:r>
-              <a:rPr lang="en-US" sz="3200" dirty="0"/>
-              <a:t>) [2]</a:t>
-            </a:r>
-          </a:p>
-        </p:txBody>
-      </p:sp>
       <p:pic>
         <p:nvPicPr>
           <p:cNvPr id="18" name="Picture 17">
@@ -4344,92 +4217,14 @@
         </p:blipFill>
         <p:spPr>
           <a:xfrm>
-            <a:off x="8650978" y="13183868"/>
-            <a:ext cx="4445562" cy="2863826"/>
+            <a:off x="6994335" y="13449215"/>
+            <a:ext cx="4107964" cy="2646346"/>
           </a:xfrm>
           <a:prstGeom prst="rect">
             <a:avLst/>
           </a:prstGeom>
         </p:spPr>
       </p:pic>
-      <p:sp>
-        <p:nvSpPr>
-          <p:cNvPr id="35" name="TextBox 34">
-            <a:extLst>
-              <a:ext uri="{FF2B5EF4-FFF2-40B4-BE49-F238E27FC236}">
-                <a16:creationId xmlns:a16="http://schemas.microsoft.com/office/drawing/2014/main" id="{CBCFF0F5-600E-4DE5-B67D-D591D427E45F}"/>
-              </a:ext>
-            </a:extLst>
-          </p:cNvPr>
-          <p:cNvSpPr txBox="1"/>
-          <p:nvPr/>
-        </p:nvSpPr>
-        <p:spPr>
-          <a:xfrm>
-            <a:off x="-16175870" y="14161509"/>
-            <a:ext cx="5388949" cy="596979"/>
-          </a:xfrm>
-          <a:prstGeom prst="rect">
-            <a:avLst/>
-          </a:prstGeom>
-          <a:noFill/>
-        </p:spPr>
-        <p:txBody>
-          <a:bodyPr wrap="square" rtlCol="0">
-            <a:spAutoFit/>
-          </a:bodyPr>
-          <a:lstStyle/>
-          <a:p>
-            <a:r>
-              <a:rPr lang="en-US" sz="3200" dirty="0"/>
-              <a:t>Bus stops: Shapefile (.</a:t>
-            </a:r>
-            <a:r>
-              <a:rPr lang="en-US" sz="3200" dirty="0" err="1"/>
-              <a:t>shp</a:t>
-            </a:r>
-            <a:r>
-              <a:rPr lang="en-US" sz="3200" dirty="0"/>
-              <a:t>) [3]</a:t>
-            </a:r>
-          </a:p>
-        </p:txBody>
-      </p:sp>
-      <p:sp>
-        <p:nvSpPr>
-          <p:cNvPr id="23" name="TextBox 22">
-            <a:extLst>
-              <a:ext uri="{FF2B5EF4-FFF2-40B4-BE49-F238E27FC236}">
-                <a16:creationId xmlns:a16="http://schemas.microsoft.com/office/drawing/2014/main" id="{E4DCF014-3A3B-46FC-8357-4F07F2CA8E2B}"/>
-              </a:ext>
-            </a:extLst>
-          </p:cNvPr>
-          <p:cNvSpPr txBox="1"/>
-          <p:nvPr/>
-        </p:nvSpPr>
-        <p:spPr>
-          <a:xfrm>
-            <a:off x="13716886" y="14045595"/>
-            <a:ext cx="4484062" cy="830997"/>
-          </a:xfrm>
-          <a:prstGeom prst="rect">
-            <a:avLst/>
-          </a:prstGeom>
-          <a:noFill/>
-        </p:spPr>
-        <p:txBody>
-          <a:bodyPr wrap="square" rtlCol="0">
-            <a:spAutoFit/>
-          </a:bodyPr>
-          <a:lstStyle/>
-          <a:p>
-            <a:r>
-              <a:rPr lang="en-US" sz="4800" dirty="0"/>
-              <a:t>Ridership Plot</a:t>
-            </a:r>
-          </a:p>
-        </p:txBody>
-      </p:sp>
       <p:cxnSp>
         <p:nvCxnSpPr>
           <p:cNvPr id="32" name="Straight Connector 31">
@@ -4642,6 +4437,76 @@
           <a:xfrm>
             <a:off x="1579119" y="16367021"/>
             <a:ext cx="16181040" cy="14353468"/>
+          </a:xfrm>
+          <a:prstGeom prst="rect">
+            <a:avLst/>
+          </a:prstGeom>
+        </p:spPr>
+      </p:pic>
+      <p:pic>
+        <p:nvPicPr>
+          <p:cNvPr id="17" name="Picture 16">
+            <a:extLst>
+              <a:ext uri="{FF2B5EF4-FFF2-40B4-BE49-F238E27FC236}">
+                <a16:creationId xmlns:a16="http://schemas.microsoft.com/office/drawing/2014/main" id="{380E43E0-717D-431C-9E46-8FFEBE61A137}"/>
+              </a:ext>
+            </a:extLst>
+          </p:cNvPr>
+          <p:cNvPicPr>
+            <a:picLocks noChangeAspect="1"/>
+          </p:cNvPicPr>
+          <p:nvPr/>
+        </p:nvPicPr>
+        <p:blipFill rotWithShape="1">
+          <a:blip r:embed="rId14">
+            <a:extLst>
+              <a:ext uri="{28A0092B-C50C-407E-A947-70E740481C1C}">
+                <a14:useLocalDpi xmlns:a14="http://schemas.microsoft.com/office/drawing/2010/main" val="0"/>
+              </a:ext>
+            </a:extLst>
+          </a:blip>
+          <a:srcRect l="3665" t="3286" r="5931" b="3448"/>
+          <a:stretch/>
+        </p:blipFill>
+        <p:spPr>
+          <a:xfrm>
+            <a:off x="11269442" y="12697782"/>
+            <a:ext cx="3431711" cy="3540302"/>
+          </a:xfrm>
+          <a:prstGeom prst="rect">
+            <a:avLst/>
+          </a:prstGeom>
+        </p:spPr>
+      </p:pic>
+      <p:pic>
+        <p:nvPicPr>
+          <p:cNvPr id="20" name="Picture 19">
+            <a:extLst>
+              <a:ext uri="{FF2B5EF4-FFF2-40B4-BE49-F238E27FC236}">
+                <a16:creationId xmlns:a16="http://schemas.microsoft.com/office/drawing/2014/main" id="{24349A8B-9C03-4A6B-90E9-9DC419923723}"/>
+              </a:ext>
+            </a:extLst>
+          </p:cNvPr>
+          <p:cNvPicPr>
+            <a:picLocks noChangeAspect="1"/>
+          </p:cNvPicPr>
+          <p:nvPr/>
+        </p:nvPicPr>
+        <p:blipFill rotWithShape="1">
+          <a:blip r:embed="rId15">
+            <a:extLst>
+              <a:ext uri="{28A0092B-C50C-407E-A947-70E740481C1C}">
+                <a14:useLocalDpi xmlns:a14="http://schemas.microsoft.com/office/drawing/2010/main" val="0"/>
+              </a:ext>
+            </a:extLst>
+          </a:blip>
+          <a:srcRect l="3889" t="6017" r="7385" b="5434"/>
+          <a:stretch/>
+        </p:blipFill>
+        <p:spPr>
+          <a:xfrm>
+            <a:off x="14817095" y="12697781"/>
+            <a:ext cx="3540591" cy="3533510"/>
           </a:xfrm>
           <a:prstGeom prst="rect">
             <a:avLst/>

</xml_diff>